<commit_message>
Add saturation detection and a few minor fixes
also cleaned up some pieces
</commit_message>
<xml_diff>
--- a/docs/Firmware_Guide.pptx
+++ b/docs/Firmware_Guide.pptx
@@ -211,7 +211,7 @@
           <a:p>
             <a:fld id="{B8670970-D18D-4B48-8492-7C85DA272BE1}" type="datetimeFigureOut">
               <a:rPr lang="en-US" smtClean="0"/>
-              <a:t>7/17/2024</a:t>
+              <a:t>8/27/2024</a:t>
             </a:fld>
             <a:endParaRPr lang="en-US"/>
           </a:p>
@@ -1272,7 +1272,7 @@
           <a:p>
             <a:fld id="{6EF3B71E-8A38-49DA-BD53-9F2AC5071340}" type="datetimeFigureOut">
               <a:rPr lang="en-US" smtClean="0"/>
-              <a:t>7/17/2024</a:t>
+              <a:t>8/27/2024</a:t>
             </a:fld>
             <a:endParaRPr lang="en-US"/>
           </a:p>
@@ -1442,7 +1442,7 @@
           <a:p>
             <a:fld id="{6EF3B71E-8A38-49DA-BD53-9F2AC5071340}" type="datetimeFigureOut">
               <a:rPr lang="en-US" smtClean="0"/>
-              <a:t>7/17/2024</a:t>
+              <a:t>8/27/2024</a:t>
             </a:fld>
             <a:endParaRPr lang="en-US"/>
           </a:p>
@@ -1622,7 +1622,7 @@
           <a:p>
             <a:fld id="{6EF3B71E-8A38-49DA-BD53-9F2AC5071340}" type="datetimeFigureOut">
               <a:rPr lang="en-US" smtClean="0"/>
-              <a:t>7/17/2024</a:t>
+              <a:t>8/27/2024</a:t>
             </a:fld>
             <a:endParaRPr lang="en-US"/>
           </a:p>
@@ -1792,7 +1792,7 @@
           <a:p>
             <a:fld id="{6EF3B71E-8A38-49DA-BD53-9F2AC5071340}" type="datetimeFigureOut">
               <a:rPr lang="en-US" smtClean="0"/>
-              <a:t>7/17/2024</a:t>
+              <a:t>8/27/2024</a:t>
             </a:fld>
             <a:endParaRPr lang="en-US"/>
           </a:p>
@@ -2038,7 +2038,7 @@
           <a:p>
             <a:fld id="{6EF3B71E-8A38-49DA-BD53-9F2AC5071340}" type="datetimeFigureOut">
               <a:rPr lang="en-US" smtClean="0"/>
-              <a:t>7/17/2024</a:t>
+              <a:t>8/27/2024</a:t>
             </a:fld>
             <a:endParaRPr lang="en-US"/>
           </a:p>
@@ -2270,7 +2270,7 @@
           <a:p>
             <a:fld id="{6EF3B71E-8A38-49DA-BD53-9F2AC5071340}" type="datetimeFigureOut">
               <a:rPr lang="en-US" smtClean="0"/>
-              <a:t>7/17/2024</a:t>
+              <a:t>8/27/2024</a:t>
             </a:fld>
             <a:endParaRPr lang="en-US"/>
           </a:p>
@@ -2637,7 +2637,7 @@
           <a:p>
             <a:fld id="{6EF3B71E-8A38-49DA-BD53-9F2AC5071340}" type="datetimeFigureOut">
               <a:rPr lang="en-US" smtClean="0"/>
-              <a:t>7/17/2024</a:t>
+              <a:t>8/27/2024</a:t>
             </a:fld>
             <a:endParaRPr lang="en-US"/>
           </a:p>
@@ -2755,7 +2755,7 @@
           <a:p>
             <a:fld id="{6EF3B71E-8A38-49DA-BD53-9F2AC5071340}" type="datetimeFigureOut">
               <a:rPr lang="en-US" smtClean="0"/>
-              <a:t>7/17/2024</a:t>
+              <a:t>8/27/2024</a:t>
             </a:fld>
             <a:endParaRPr lang="en-US"/>
           </a:p>
@@ -2850,7 +2850,7 @@
           <a:p>
             <a:fld id="{6EF3B71E-8A38-49DA-BD53-9F2AC5071340}" type="datetimeFigureOut">
               <a:rPr lang="en-US" smtClean="0"/>
-              <a:t>7/17/2024</a:t>
+              <a:t>8/27/2024</a:t>
             </a:fld>
             <a:endParaRPr lang="en-US"/>
           </a:p>
@@ -3127,7 +3127,7 @@
           <a:p>
             <a:fld id="{6EF3B71E-8A38-49DA-BD53-9F2AC5071340}" type="datetimeFigureOut">
               <a:rPr lang="en-US" smtClean="0"/>
-              <a:t>7/17/2024</a:t>
+              <a:t>8/27/2024</a:t>
             </a:fld>
             <a:endParaRPr lang="en-US"/>
           </a:p>
@@ -3380,7 +3380,7 @@
           <a:p>
             <a:fld id="{6EF3B71E-8A38-49DA-BD53-9F2AC5071340}" type="datetimeFigureOut">
               <a:rPr lang="en-US" smtClean="0"/>
-              <a:t>7/17/2024</a:t>
+              <a:t>8/27/2024</a:t>
             </a:fld>
             <a:endParaRPr lang="en-US"/>
           </a:p>
@@ -3593,7 +3593,7 @@
           <a:p>
             <a:fld id="{6EF3B71E-8A38-49DA-BD53-9F2AC5071340}" type="datetimeFigureOut">
               <a:rPr lang="en-US" smtClean="0"/>
-              <a:t>7/17/2024</a:t>
+              <a:t>8/27/2024</a:t>
             </a:fld>
             <a:endParaRPr lang="en-US"/>
           </a:p>
@@ -4327,7 +4327,11 @@
           <a:p>
             <a:r>
               <a:rPr lang="en-US" dirty="0" smtClean="0"/>
-              <a:t>Basic Firmware Layout (Timing Details)</a:t>
+              <a:t>Basic Firmware </a:t>
+            </a:r>
+            <a:r>
+              <a:rPr lang="en-US" dirty="0" smtClean="0"/>
+              <a:t>Layout</a:t>
             </a:r>
             <a:endParaRPr lang="en-US" dirty="0"/>
           </a:p>
@@ -5597,15 +5601,16 @@
             <a:pPr algn="ctr"/>
             <a:r>
               <a:rPr lang="en-US" b="1" dirty="0" smtClean="0"/>
-              <a:t>Hold code</a:t>
+              <a:t>LATCH </a:t>
             </a:r>
           </a:p>
           <a:p>
             <a:pPr algn="ctr"/>
             <a:r>
               <a:rPr lang="en-US" b="1" dirty="0" smtClean="0"/>
-              <a:t>via gate</a:t>
-            </a:r>
+              <a:t>Trigger Code</a:t>
+            </a:r>
+            <a:endParaRPr lang="en-US" b="1" dirty="0" smtClean="0"/>
           </a:p>
         </p:txBody>
       </p:sp>
@@ -5710,15 +5715,9 @@
             <a:pPr algn="ctr"/>
             <a:r>
               <a:rPr lang="en-US" b="1" dirty="0" smtClean="0"/>
-              <a:t>Hold timestamp</a:t>
-            </a:r>
-          </a:p>
-          <a:p>
-            <a:pPr algn="ctr"/>
-            <a:r>
-              <a:rPr lang="en-US" b="1" dirty="0" smtClean="0"/>
-              <a:t>in FIFO</a:t>
-            </a:r>
+              <a:t>LATCH Timestamp</a:t>
+            </a:r>
+            <a:endParaRPr lang="en-US" b="1" dirty="0" smtClean="0"/>
           </a:p>
         </p:txBody>
       </p:sp>
@@ -6200,50 +6199,16 @@
       </p:cxnSp>
       <p:cxnSp>
         <p:nvCxnSpPr>
-          <p:cNvPr id="140" name="Elbow Connector 139"/>
+          <p:cNvPr id="143" name="Straight Arrow Connector 142"/>
           <p:cNvCxnSpPr>
             <a:stCxn id="123" idx="3"/>
-            <a:endCxn id="91" idx="0"/>
           </p:cNvCxnSpPr>
           <p:nvPr/>
         </p:nvCxnSpPr>
         <p:spPr>
-          <a:xfrm>
-            <a:off x="6684535" y="2919759"/>
-            <a:ext cx="245655" cy="1547313"/>
-          </a:xfrm>
-          <a:prstGeom prst="bentConnector2">
-            <a:avLst/>
-          </a:prstGeom>
-          <a:ln w="38100">
-            <a:tailEnd type="triangle"/>
-          </a:ln>
-        </p:spPr>
-        <p:style>
-          <a:lnRef idx="1">
-            <a:schemeClr val="accent1"/>
-          </a:lnRef>
-          <a:fillRef idx="0">
-            <a:schemeClr val="accent1"/>
-          </a:fillRef>
-          <a:effectRef idx="0">
-            <a:schemeClr val="accent1"/>
-          </a:effectRef>
-          <a:fontRef idx="minor">
-            <a:schemeClr val="tx1"/>
-          </a:fontRef>
-        </p:style>
-      </p:cxnSp>
-      <p:cxnSp>
-        <p:nvCxnSpPr>
-          <p:cNvPr id="143" name="Straight Arrow Connector 142"/>
-          <p:cNvCxnSpPr/>
-          <p:nvPr/>
-        </p:nvCxnSpPr>
-        <p:spPr>
           <a:xfrm flipV="1">
-            <a:off x="6746447" y="2906324"/>
-            <a:ext cx="1854628" cy="13435"/>
+            <a:off x="6684535" y="2906325"/>
+            <a:ext cx="1916540" cy="13434"/>
           </a:xfrm>
           <a:prstGeom prst="straightConnector1">
             <a:avLst/>
@@ -6382,44 +6347,6 @@
           </a:fontRef>
         </p:style>
       </p:cxnSp>
-      <p:sp>
-        <p:nvSpPr>
-          <p:cNvPr id="60" name="TextBox 59"/>
-          <p:cNvSpPr txBox="1"/>
-          <p:nvPr/>
-        </p:nvSpPr>
-        <p:spPr>
-          <a:xfrm>
-            <a:off x="6883878" y="3764407"/>
-            <a:ext cx="1683193" cy="646331"/>
-          </a:xfrm>
-          <a:prstGeom prst="rect">
-            <a:avLst/>
-          </a:prstGeom>
-          <a:noFill/>
-        </p:spPr>
-        <p:txBody>
-          <a:bodyPr wrap="square" rtlCol="0">
-            <a:spAutoFit/>
-          </a:bodyPr>
-          <a:lstStyle/>
-          <a:p>
-            <a:r>
-              <a:rPr lang="en-US" b="1" dirty="0" smtClean="0">
-                <a:solidFill>
-                  <a:schemeClr val="accent1"/>
-                </a:solidFill>
-              </a:rPr>
-              <a:t>Tell FIFO to send</a:t>
-            </a:r>
-            <a:endParaRPr lang="en-US" b="1" dirty="0">
-              <a:solidFill>
-                <a:schemeClr val="accent1"/>
-              </a:solidFill>
-            </a:endParaRPr>
-          </a:p>
-        </p:txBody>
-      </p:sp>
     </p:spTree>
     <p:extLst>
       <p:ext uri="{BB962C8B-B14F-4D97-AF65-F5344CB8AC3E}">
@@ -6430,6 +6357,13 @@
   <p:clrMapOvr>
     <a:masterClrMapping/>
   </p:clrMapOvr>
+  <p:timing>
+    <p:tnLst>
+      <p:par>
+        <p:cTn id="1" dur="indefinite" restart="never" nodeType="tmRoot"/>
+      </p:par>
+    </p:tnLst>
+  </p:timing>
 </p:sld>
 </file>
 
@@ -6695,7 +6629,7 @@
         </p:spPr>
         <p:txBody>
           <a:bodyPr>
-            <a:normAutofit fontScale="77500" lnSpcReduction="20000"/>
+            <a:normAutofit/>
           </a:bodyPr>
           <a:lstStyle/>
           <a:p>
@@ -6720,35 +6654,6 @@
           </a:p>
           <a:p>
             <a:r>
-              <a:rPr lang="en-US" i="1" dirty="0" err="1">
-                <a:latin typeface="Consolas" panose="020B0609020204030204" pitchFamily="49" charset="0"/>
-              </a:rPr>
-              <a:t>smalltest</a:t>
-            </a:r>
-            <a:r>
-              <a:rPr lang="en-US" b="1" i="1" dirty="0"/>
-              <a:t> </a:t>
-            </a:r>
-            <a:r>
-              <a:rPr lang="en-US" dirty="0"/>
-              <a:t>– Will not be ported to 5560; sets a small few registers and will be wrapped into </a:t>
-            </a:r>
-            <a:r>
-              <a:rPr lang="en-US" dirty="0" err="1">
-                <a:latin typeface="Consolas" panose="020B0609020204030204" pitchFamily="49" charset="0"/>
-              </a:rPr>
-              <a:t>setregisters</a:t>
-            </a:r>
-            <a:r>
-              <a:rPr lang="en-US" dirty="0" smtClean="0"/>
-              <a:t>.</a:t>
-            </a:r>
-            <a:endParaRPr lang="en-US" b="1" dirty="0" smtClean="0">
-              <a:latin typeface="Consolas" panose="020B0609020204030204" pitchFamily="49" charset="0"/>
-            </a:endParaRPr>
-          </a:p>
-          <a:p>
-            <a:r>
               <a:rPr lang="en-US" dirty="0" err="1" smtClean="0">
                 <a:latin typeface="Consolas" panose="020B0609020204030204" pitchFamily="49" charset="0"/>
               </a:rPr>
@@ -6772,10 +6677,10 @@
           </a:p>
           <a:p>
             <a:r>
-              <a:rPr lang="en-US" b="1" dirty="0" err="1" smtClean="0">
+              <a:rPr lang="en-US" b="1" dirty="0" smtClean="0">
                 <a:latin typeface="Consolas" panose="020B0609020204030204" pitchFamily="49" charset="0"/>
               </a:rPr>
-              <a:t>scanrate</a:t>
+              <a:t>rate</a:t>
             </a:r>
             <a:r>
               <a:rPr lang="en-US" b="1" dirty="0" smtClean="0"/>
@@ -6783,67 +6688,11 @@
             </a:r>
             <a:r>
               <a:rPr lang="en-US" dirty="0" smtClean="0"/>
-              <a:t>– gets the rate at different lower thresholds and reports them back.</a:t>
-            </a:r>
-          </a:p>
-          <a:p>
-            <a:r>
-              <a:rPr lang="en-US" b="1" dirty="0" err="1">
-                <a:latin typeface="Consolas" panose="020B0609020204030204" pitchFamily="49" charset="0"/>
-              </a:rPr>
-              <a:t>scanupper</a:t>
-            </a:r>
-            <a:r>
-              <a:rPr lang="en-US" b="1" dirty="0"/>
-              <a:t> </a:t>
-            </a:r>
-            <a:r>
-              <a:rPr lang="en-US" dirty="0"/>
-              <a:t>– gets the rate at different upper thresholds and reports them back</a:t>
+              <a:t>– gets the rate at </a:t>
             </a:r>
             <a:r>
               <a:rPr lang="en-US" dirty="0" smtClean="0"/>
-              <a:t>.</a:t>
-            </a:r>
-          </a:p>
-          <a:p>
-            <a:r>
-              <a:rPr lang="en-US" b="1" dirty="0" err="1">
-                <a:latin typeface="Consolas" panose="020B0609020204030204" pitchFamily="49" charset="0"/>
-              </a:rPr>
-              <a:t>scanwindow</a:t>
-            </a:r>
-            <a:r>
-              <a:rPr lang="en-US" b="1" dirty="0"/>
-              <a:t> </a:t>
-            </a:r>
-            <a:r>
-              <a:rPr lang="en-US" dirty="0"/>
-              <a:t>– gets the rate at different upper + lower thresholds of the same width and reports them back</a:t>
-            </a:r>
-            <a:r>
-              <a:rPr lang="en-US" dirty="0" smtClean="0"/>
-              <a:t>.</a:t>
-            </a:r>
-          </a:p>
-          <a:p>
-            <a:r>
-              <a:rPr lang="en-US" b="1" i="1" dirty="0" err="1">
-                <a:latin typeface="Consolas" panose="020B0609020204030204" pitchFamily="49" charset="0"/>
-              </a:rPr>
-              <a:t>singlerate</a:t>
-            </a:r>
-            <a:r>
-              <a:rPr lang="en-US" b="1" dirty="0"/>
-              <a:t> </a:t>
-            </a:r>
-            <a:r>
-              <a:rPr lang="en-US" dirty="0"/>
-              <a:t>– gets the rate once, at current thresholds</a:t>
-            </a:r>
-            <a:r>
-              <a:rPr lang="en-US" dirty="0" smtClean="0"/>
-              <a:t>.</a:t>
+              <a:t>a configurable combination/series of thresholds and reports them back. </a:t>
             </a:r>
           </a:p>
           <a:p>
@@ -6875,51 +6724,13 @@
             </a:r>
             <a:r>
               <a:rPr lang="en-US" dirty="0" smtClean="0"/>
-              <a:t>– retrieves packet data with energies, timestamps, and trigger codes.</a:t>
+              <a:t>– retrieves packet data with energies, timestamps, and trigger codes</a:t>
+            </a:r>
+            <a:r>
+              <a:rPr lang="en-US" dirty="0" smtClean="0"/>
+              <a:t>.</a:t>
             </a:r>
             <a:endParaRPr lang="en-US" b="1" dirty="0" smtClean="0"/>
-          </a:p>
-          <a:p>
-            <a:r>
-              <a:rPr lang="en-US" i="1" dirty="0" err="1" smtClean="0">
-                <a:latin typeface="Consolas" panose="020B0609020204030204" pitchFamily="49" charset="0"/>
-              </a:rPr>
-              <a:t>fifotest</a:t>
-            </a:r>
-            <a:r>
-              <a:rPr lang="en-US" i="1" dirty="0" smtClean="0"/>
-              <a:t> </a:t>
-            </a:r>
-            <a:r>
-              <a:rPr lang="en-US" i="1" dirty="0"/>
-              <a:t>– </a:t>
-            </a:r>
-            <a:r>
-              <a:rPr lang="en-US" dirty="0"/>
-              <a:t>defunct. </a:t>
-            </a:r>
-            <a:r>
-              <a:rPr lang="en-US" dirty="0" smtClean="0"/>
-              <a:t>Retrieved a register (no longer exists) to verify data went into a FIFO.</a:t>
-            </a:r>
-            <a:endParaRPr lang="en-US" i="1" dirty="0" smtClean="0"/>
-          </a:p>
-          <a:p>
-            <a:r>
-              <a:rPr lang="en-US" i="1" dirty="0" err="1" smtClean="0">
-                <a:latin typeface="Consolas" panose="020B0609020204030204" pitchFamily="49" charset="0"/>
-              </a:rPr>
-              <a:t>fttest</a:t>
-            </a:r>
-            <a:r>
-              <a:rPr lang="en-US" i="1" dirty="0" smtClean="0"/>
-              <a:t> </a:t>
-            </a:r>
-            <a:r>
-              <a:rPr lang="en-US" dirty="0" smtClean="0"/>
-              <a:t>– Defunct. Tested possibility of connection using an alternate backend.</a:t>
-            </a:r>
-            <a:endParaRPr lang="en-US" b="1" dirty="0"/>
           </a:p>
         </p:txBody>
       </p:sp>
@@ -7485,7 +7296,11 @@
           <a:p>
             <a:r>
               <a:rPr lang="en-US" dirty="0" smtClean="0"/>
-              <a:t>Main Trigger Process</a:t>
+              <a:t>Simplified </a:t>
+            </a:r>
+            <a:r>
+              <a:rPr lang="en-US" dirty="0" smtClean="0"/>
+              <a:t>Trigger Process</a:t>
             </a:r>
             <a:endParaRPr lang="en-US" dirty="0"/>
           </a:p>
@@ -11330,11 +11145,7 @@
           <a:p>
             <a:r>
               <a:rPr lang="en-US" dirty="0" smtClean="0"/>
-              <a:t>Current </a:t>
-            </a:r>
-            <a:r>
-              <a:rPr lang="en-US" dirty="0" smtClean="0"/>
-              <a:t>Issues</a:t>
+              <a:t>Current Issues</a:t>
             </a:r>
             <a:endParaRPr lang="en-US" dirty="0"/>
           </a:p>
@@ -11372,11 +11183,7 @@
             </a:r>
             <a:r>
               <a:rPr lang="en-US" dirty="0" smtClean="0"/>
-              <a:t>similar, sometimes with a difference of </a:t>
-            </a:r>
-            <a:r>
-              <a:rPr lang="en-US" dirty="0" smtClean="0"/>
-              <a:t>1-2</a:t>
+              <a:t>similar, sometimes with a difference of 1-2</a:t>
             </a:r>
           </a:p>
           <a:p>
@@ -11385,14 +11192,12 @@
               <a:rPr lang="en-US" dirty="0" smtClean="0"/>
               <a:t>Still true? Or resolved alongside other issues?</a:t>
             </a:r>
-            <a:endParaRPr lang="en-US" dirty="0" smtClean="0"/>
           </a:p>
           <a:p>
             <a:r>
               <a:rPr lang="en-US" b="1" dirty="0" smtClean="0"/>
               <a:t>If we send more than 24 timestamps at once, we lose some data at the end</a:t>
             </a:r>
-            <a:endParaRPr lang="en-US" b="1" dirty="0" smtClean="0"/>
           </a:p>
           <a:p>
             <a:pPr lvl="1"/>

</xml_diff>